<commit_message>
Added one dot to image
</commit_message>
<xml_diff>
--- a/GIT vs X.pptx
+++ b/GIT vs X.pptx
@@ -128,7 +128,7 @@
       </p14:sectionLst>
     </p:ext>
     <p:ext uri="{EFAFB233-063F-42B5-8137-9DF3F51BA10A}">
-      <p15:sldGuideLst xmlns:p15="http://schemas.microsoft.com/office/powerpoint/2012/main" xmlns="">
+      <p15:sldGuideLst xmlns="" xmlns:p15="http://schemas.microsoft.com/office/powerpoint/2012/main">
         <p15:guide id="1" orient="horz" pos="2160">
           <p15:clr>
             <a:srgbClr val="A4A3A4"/>
@@ -142,7 +142,7 @@
       </p15:sldGuideLst>
     </p:ext>
     <p:ext uri="{2D200454-40CA-4A62-9FC3-DE9A4176ACB9}">
-      <p15:notesGuideLst xmlns:p15="http://schemas.microsoft.com/office/powerpoint/2012/main" xmlns="">
+      <p15:notesGuideLst xmlns="" xmlns:p15="http://schemas.microsoft.com/office/powerpoint/2012/main">
         <p15:guide id="1" orient="horz" pos="2880">
           <p15:clr>
             <a:srgbClr val="A4A3A4"/>
@@ -5266,7 +5266,7 @@
             <a:fld id="{75D1BA6D-2E3B-4BBA-A561-BC3FA4751C96}" type="datetimeFigureOut">
               <a:rPr lang="en-US" smtClean="0"/>
               <a:pPr/>
-              <a:t>2/24/2015</a:t>
+              <a:t>3/8/2015</a:t>
             </a:fld>
             <a:endParaRPr lang="en-US"/>
           </a:p>
@@ -10446,7 +10446,11 @@
           <a:p>
             <a:r>
               <a:rPr lang="en-US" dirty="0" smtClean="0"/>
-              <a:t>GIT vs X….</a:t>
+              <a:t>GIT vs </a:t>
+            </a:r>
+            <a:r>
+              <a:rPr lang="en-US" dirty="0" smtClean="0"/>
+              <a:t>XX….</a:t>
             </a:r>
             <a:endParaRPr lang="he-IL" dirty="0"/>
           </a:p>

</xml_diff>